<commit_message>
presentation en cours remarques DFA
</commit_message>
<xml_diff>
--- a/projet_certification_github_group1.pptx
+++ b/projet_certification_github_group1.pptx
@@ -5,10 +5,10 @@
     <p:sldMasterId id="2147483648" r:id="rId1"/>
   </p:sldMasterIdLst>
   <p:notesMasterIdLst>
-    <p:notesMasterId r:id="rId29"/>
+    <p:notesMasterId r:id="rId28"/>
   </p:notesMasterIdLst>
   <p:handoutMasterIdLst>
-    <p:handoutMasterId r:id="rId30"/>
+    <p:handoutMasterId r:id="rId29"/>
   </p:handoutMasterIdLst>
   <p:sldIdLst>
     <p:sldId id="256" r:id="rId2"/>
@@ -22,22 +22,21 @@
     <p:sldId id="265" r:id="rId10"/>
     <p:sldId id="266" r:id="rId11"/>
     <p:sldId id="267" r:id="rId12"/>
-    <p:sldId id="268" r:id="rId13"/>
-    <p:sldId id="269" r:id="rId14"/>
-    <p:sldId id="270" r:id="rId15"/>
-    <p:sldId id="272" r:id="rId16"/>
-    <p:sldId id="273" r:id="rId17"/>
-    <p:sldId id="274" r:id="rId18"/>
-    <p:sldId id="275" r:id="rId19"/>
-    <p:sldId id="276" r:id="rId20"/>
-    <p:sldId id="279" r:id="rId21"/>
-    <p:sldId id="277" r:id="rId22"/>
-    <p:sldId id="280" r:id="rId23"/>
-    <p:sldId id="281" r:id="rId24"/>
-    <p:sldId id="282" r:id="rId25"/>
-    <p:sldId id="278" r:id="rId26"/>
-    <p:sldId id="285" r:id="rId27"/>
-    <p:sldId id="259" r:id="rId28"/>
+    <p:sldId id="269" r:id="rId13"/>
+    <p:sldId id="270" r:id="rId14"/>
+    <p:sldId id="272" r:id="rId15"/>
+    <p:sldId id="273" r:id="rId16"/>
+    <p:sldId id="274" r:id="rId17"/>
+    <p:sldId id="275" r:id="rId18"/>
+    <p:sldId id="276" r:id="rId19"/>
+    <p:sldId id="279" r:id="rId20"/>
+    <p:sldId id="277" r:id="rId21"/>
+    <p:sldId id="280" r:id="rId22"/>
+    <p:sldId id="281" r:id="rId23"/>
+    <p:sldId id="282" r:id="rId24"/>
+    <p:sldId id="278" r:id="rId25"/>
+    <p:sldId id="285" r:id="rId26"/>
+    <p:sldId id="259" r:id="rId27"/>
   </p:sldIdLst>
   <p:sldSz cx="12192000" cy="6858000"/>
   <p:notesSz cx="6858000" cy="9144000"/>
@@ -5204,7 +5203,7 @@
         </p:spPr>
         <p:txBody>
           <a:bodyPr vert="horz" lIns="91440" tIns="45720" rIns="91440" bIns="45720" rtlCol="0" anchor="b">
-            <a:normAutofit fontScale="67500" lnSpcReduction="20000"/>
+            <a:normAutofit fontScale="30000" lnSpcReduction="20000"/>
           </a:bodyPr>
           <a:lstStyle>
             <a:lvl1pPr algn="ctr" defTabSz="914400" rtl="0" eaLnBrk="1" latinLnBrk="0" hangingPunct="1">
@@ -5231,7 +5230,7 @@
               <a:buChar char="q"/>
             </a:pPr>
             <a:r>
-              <a:rPr lang="fr-FR" sz="5300" b="1" dirty="0" err="1">
+              <a:rPr lang="fr-FR" sz="10700" b="1" dirty="0" err="1">
                 <a:solidFill>
                   <a:srgbClr val="0070C0"/>
                 </a:solidFill>
@@ -5239,10 +5238,10 @@
                 <a:ea typeface="+mn-ea"/>
                 <a:cs typeface="+mn-cs"/>
               </a:rPr>
-              <a:t>SearchEngine</a:t>
-            </a:r>
-            <a:r>
-              <a:rPr lang="fr-FR" sz="5300" b="1" dirty="0">
+              <a:t>BasicAnalysis</a:t>
+            </a:r>
+            <a:r>
+              <a:rPr lang="fr-FR" sz="10700" b="1" dirty="0">
                 <a:solidFill>
                   <a:srgbClr val="0070C0"/>
                 </a:solidFill>
@@ -5265,6 +5264,98 @@
             </a:endParaRPr>
           </a:p>
           <a:p>
+            <a:pPr marL="457200" indent="-457200" algn="l">
+              <a:buFont typeface="Wingdings" panose="05000000000000000000" pitchFamily="2" charset="2"/>
+              <a:buChar char="§"/>
+            </a:pPr>
+            <a:r>
+              <a:rPr lang="fr-FR" sz="8300" b="1" dirty="0" err="1"/>
+              <a:t>BigQuery</a:t>
+            </a:r>
+            <a:r>
+              <a:rPr lang="fr-FR" sz="8300" b="1" dirty="0"/>
+              <a:t> API </a:t>
+            </a:r>
+            <a:r>
+              <a:rPr lang="fr-FR" sz="8300" b="1" dirty="0" err="1"/>
+              <a:t>GoogleCloud</a:t>
+            </a:r>
+            <a:endParaRPr lang="fr-FR" sz="8300" b="1" dirty="0"/>
+          </a:p>
+          <a:p>
+            <a:pPr marL="457200" indent="-457200" algn="l">
+              <a:buFont typeface="Wingdings" panose="05000000000000000000" pitchFamily="2" charset="2"/>
+              <a:buChar char="§"/>
+            </a:pPr>
+            <a:r>
+              <a:rPr lang="fr-FR" sz="8300" b="1" dirty="0"/>
+              <a:t>Création d’un projet</a:t>
+            </a:r>
+          </a:p>
+          <a:p>
+            <a:pPr marL="457200" indent="-457200" algn="l">
+              <a:buFont typeface="Wingdings" panose="05000000000000000000" pitchFamily="2" charset="2"/>
+              <a:buChar char="§"/>
+            </a:pPr>
+            <a:r>
+              <a:rPr lang="fr-FR" sz="8300" b="1" dirty="0"/>
+              <a:t>Certificat PKCS12 ou fichier </a:t>
+            </a:r>
+            <a:r>
+              <a:rPr lang="fr-FR" sz="8300" b="1" dirty="0" err="1"/>
+              <a:t>Json</a:t>
+            </a:r>
+            <a:endParaRPr lang="fr-FR" sz="8300" b="1" dirty="0"/>
+          </a:p>
+          <a:p>
+            <a:pPr marL="457200" indent="-457200" algn="l">
+              <a:buFont typeface="Wingdings" panose="05000000000000000000" pitchFamily="2" charset="2"/>
+              <a:buChar char="§"/>
+            </a:pPr>
+            <a:r>
+              <a:rPr lang="fr-FR" sz="8300" b="1" dirty="0"/>
+              <a:t>Administrateur Big </a:t>
+            </a:r>
+            <a:r>
+              <a:rPr lang="fr-FR" sz="8300" b="1" dirty="0" err="1"/>
+              <a:t>Query</a:t>
+            </a:r>
+            <a:endParaRPr lang="fr-FR" sz="8300" b="1" dirty="0"/>
+          </a:p>
+          <a:p>
+            <a:pPr marL="457200" indent="-457200" algn="l">
+              <a:buFont typeface="Wingdings" panose="05000000000000000000" pitchFamily="2" charset="2"/>
+              <a:buChar char="§"/>
+            </a:pPr>
+            <a:r>
+              <a:rPr lang="fr-FR" sz="8300" b="1" dirty="0"/>
+              <a:t>Docker Spark </a:t>
+            </a:r>
+            <a:r>
+              <a:rPr lang="fr-FR" sz="8300" b="1" dirty="0" err="1"/>
+              <a:t>Jupyter</a:t>
+            </a:r>
+            <a:r>
+              <a:rPr lang="fr-FR" sz="8300" b="1" dirty="0"/>
+              <a:t> </a:t>
+            </a:r>
+            <a:r>
+              <a:rPr lang="fr-FR" sz="8300" b="1" dirty="0" err="1"/>
+              <a:t>BigQuery</a:t>
+            </a:r>
+            <a:endParaRPr lang="fr-FR" sz="8300" b="1" dirty="0"/>
+          </a:p>
+          <a:p>
+            <a:pPr marL="457200" indent="-457200" algn="l">
+              <a:buFont typeface="Wingdings" panose="05000000000000000000" pitchFamily="2" charset="2"/>
+              <a:buChar char="§"/>
+            </a:pPr>
+            <a:r>
+              <a:rPr lang="fr-FR" sz="8300" b="1" dirty="0"/>
+              <a:t>bq_helper.py (https://github.com/SohierDane/BigQuery_Helper/blob/master/bq_helper.py)</a:t>
+            </a:r>
+          </a:p>
+          <a:p>
             <a:pPr algn="l"/>
             <a:endParaRPr lang="fr-FR" sz="8500" b="1" dirty="0">
               <a:solidFill>
@@ -5300,40 +5391,10 @@
           </a:p>
         </p:txBody>
       </p:sp>
-      <p:pic>
-        <p:nvPicPr>
-          <p:cNvPr id="5" name="Image 4">
-            <a:extLst>
-              <a:ext uri="{FF2B5EF4-FFF2-40B4-BE49-F238E27FC236}">
-                <a16:creationId xmlns:a16="http://schemas.microsoft.com/office/drawing/2014/main" id="{5D088A9B-851A-446A-A993-9705549954E1}"/>
-              </a:ext>
-            </a:extLst>
-          </p:cNvPr>
-          <p:cNvPicPr>
-            <a:picLocks noChangeAspect="1"/>
-          </p:cNvPicPr>
-          <p:nvPr/>
-        </p:nvPicPr>
-        <p:blipFill>
-          <a:blip r:embed="rId2"/>
-          <a:stretch>
-            <a:fillRect/>
-          </a:stretch>
-        </p:blipFill>
-        <p:spPr>
-          <a:xfrm>
-            <a:off x="4772098" y="1983031"/>
-            <a:ext cx="2028825" cy="3876675"/>
-          </a:xfrm>
-          <a:prstGeom prst="rect">
-            <a:avLst/>
-          </a:prstGeom>
-        </p:spPr>
-      </p:pic>
     </p:spTree>
     <p:extLst>
       <p:ext uri="{BB962C8B-B14F-4D97-AF65-F5344CB8AC3E}">
-        <p14:creationId xmlns:p14="http://schemas.microsoft.com/office/powerpoint/2010/main" val="3864962435"/>
+        <p14:creationId xmlns:p14="http://schemas.microsoft.com/office/powerpoint/2010/main" val="2802922888"/>
       </p:ext>
     </p:extLst>
   </p:cSld>
@@ -5388,422 +5449,6 @@
           </a:bodyPr>
           <a:lstStyle/>
           <a:p>
-            <a:pPr algn="l"/>
-            <a:br>
-              <a:rPr lang="fr-FR" sz="2400" dirty="0"/>
-            </a:br>
-            <a:br>
-              <a:rPr lang="fr-FR" sz="2400" dirty="0"/>
-            </a:br>
-            <a:br>
-              <a:rPr lang="fr-FR" sz="2400" dirty="0"/>
-            </a:br>
-            <a:br>
-              <a:rPr lang="fr-FR" sz="2400" dirty="0"/>
-            </a:br>
-            <a:br>
-              <a:rPr lang="fr-FR" sz="2400" dirty="0"/>
-            </a:br>
-            <a:endParaRPr lang="fr-FR" sz="2400" dirty="0"/>
-          </a:p>
-        </p:txBody>
-      </p:sp>
-      <p:sp>
-        <p:nvSpPr>
-          <p:cNvPr id="3" name="Sous-titre 2">
-            <a:extLst>
-              <a:ext uri="{FF2B5EF4-FFF2-40B4-BE49-F238E27FC236}">
-                <a16:creationId xmlns:a16="http://schemas.microsoft.com/office/drawing/2014/main" id="{1B85E2F9-A5BC-4D25-A6A3-2A92E0FDED70}"/>
-              </a:ext>
-            </a:extLst>
-          </p:cNvPr>
-          <p:cNvSpPr>
-            <a:spLocks noGrp="1"/>
-          </p:cNvSpPr>
-          <p:nvPr>
-            <p:ph type="subTitle" idx="1"/>
-          </p:nvPr>
-        </p:nvSpPr>
-        <p:spPr>
-          <a:xfrm>
-            <a:off x="731520" y="136525"/>
-            <a:ext cx="10325685" cy="1050399"/>
-          </a:xfrm>
-        </p:spPr>
-        <p:txBody>
-          <a:bodyPr>
-            <a:normAutofit/>
-          </a:bodyPr>
-          <a:lstStyle/>
-          <a:p>
-            <a:r>
-              <a:rPr lang="fr-FR" b="1" dirty="0"/>
-              <a:t>Certification </a:t>
-            </a:r>
-            <a:r>
-              <a:rPr lang="fr-FR" b="1" dirty="0" err="1"/>
-              <a:t>Cegefos</a:t>
-            </a:r>
-            <a:r>
-              <a:rPr lang="fr-FR" b="1" dirty="0"/>
-              <a:t> Big Data </a:t>
-            </a:r>
-          </a:p>
-          <a:p>
-            <a:r>
-              <a:rPr lang="fr-FR" sz="3400" b="1" dirty="0">
-                <a:solidFill>
-                  <a:srgbClr val="FF0000"/>
-                </a:solidFill>
-              </a:rPr>
-              <a:t>Analyses des </a:t>
-            </a:r>
-            <a:r>
-              <a:rPr lang="fr-FR" sz="3400" b="1" dirty="0" err="1">
-                <a:solidFill>
-                  <a:srgbClr val="FF0000"/>
-                </a:solidFill>
-              </a:rPr>
-              <a:t>DataSets</a:t>
-            </a:r>
-            <a:r>
-              <a:rPr lang="fr-FR" sz="3400" b="1" dirty="0">
-                <a:solidFill>
-                  <a:srgbClr val="FF0000"/>
-                </a:solidFill>
-              </a:rPr>
-              <a:t> GitHub</a:t>
-            </a:r>
-          </a:p>
-        </p:txBody>
-      </p:sp>
-      <p:sp>
-        <p:nvSpPr>
-          <p:cNvPr id="6" name="Espace réservé de la date 5">
-            <a:extLst>
-              <a:ext uri="{FF2B5EF4-FFF2-40B4-BE49-F238E27FC236}">
-                <a16:creationId xmlns:a16="http://schemas.microsoft.com/office/drawing/2014/main" id="{1150BC5C-5713-43E9-A04B-159B1EDF0C94}"/>
-              </a:ext>
-            </a:extLst>
-          </p:cNvPr>
-          <p:cNvSpPr>
-            <a:spLocks noGrp="1"/>
-          </p:cNvSpPr>
-          <p:nvPr>
-            <p:ph type="dt" sz="half" idx="10"/>
-          </p:nvPr>
-        </p:nvSpPr>
-        <p:spPr/>
-        <p:txBody>
-          <a:bodyPr/>
-          <a:lstStyle/>
-          <a:p>
-            <a:r>
-              <a:rPr lang="fr-FR"/>
-              <a:t>19/03/2018</a:t>
-            </a:r>
-          </a:p>
-        </p:txBody>
-      </p:sp>
-      <p:sp>
-        <p:nvSpPr>
-          <p:cNvPr id="7" name="Espace réservé du pied de page 6">
-            <a:extLst>
-              <a:ext uri="{FF2B5EF4-FFF2-40B4-BE49-F238E27FC236}">
-                <a16:creationId xmlns:a16="http://schemas.microsoft.com/office/drawing/2014/main" id="{189FFD1E-7DE7-499F-8B85-382EB1F8DBD4}"/>
-              </a:ext>
-            </a:extLst>
-          </p:cNvPr>
-          <p:cNvSpPr>
-            <a:spLocks noGrp="1"/>
-          </p:cNvSpPr>
-          <p:nvPr>
-            <p:ph type="ftr" sz="quarter" idx="11"/>
-          </p:nvPr>
-        </p:nvSpPr>
-        <p:spPr/>
-        <p:txBody>
-          <a:bodyPr/>
-          <a:lstStyle/>
-          <a:p>
-            <a:r>
-              <a:rPr lang="fr-FR"/>
-              <a:t>Cegefos Certification Groupe1 : DAB / NHA / DFA / RKO</a:t>
-            </a:r>
-          </a:p>
-        </p:txBody>
-      </p:sp>
-      <p:sp>
-        <p:nvSpPr>
-          <p:cNvPr id="8" name="Titre 1">
-            <a:extLst>
-              <a:ext uri="{FF2B5EF4-FFF2-40B4-BE49-F238E27FC236}">
-                <a16:creationId xmlns:a16="http://schemas.microsoft.com/office/drawing/2014/main" id="{8406407B-8F03-4383-A51F-864F1C6820F3}"/>
-              </a:ext>
-            </a:extLst>
-          </p:cNvPr>
-          <p:cNvSpPr txBox="1">
-            <a:spLocks/>
-          </p:cNvSpPr>
-          <p:nvPr/>
-        </p:nvSpPr>
-        <p:spPr>
-          <a:xfrm>
-            <a:off x="937259" y="1339324"/>
-            <a:ext cx="10219006" cy="4812495"/>
-          </a:xfrm>
-          <a:prstGeom prst="rect">
-            <a:avLst/>
-          </a:prstGeom>
-        </p:spPr>
-        <p:txBody>
-          <a:bodyPr vert="horz" lIns="91440" tIns="45720" rIns="91440" bIns="45720" rtlCol="0" anchor="b">
-            <a:normAutofit fontScale="30000" lnSpcReduction="20000"/>
-          </a:bodyPr>
-          <a:lstStyle>
-            <a:lvl1pPr algn="ctr" defTabSz="914400" rtl="0" eaLnBrk="1" latinLnBrk="0" hangingPunct="1">
-              <a:lnSpc>
-                <a:spcPct val="90000"/>
-              </a:lnSpc>
-              <a:spcBef>
-                <a:spcPct val="0"/>
-              </a:spcBef>
-              <a:buNone/>
-              <a:defRPr sz="6000" kern="1200">
-                <a:solidFill>
-                  <a:schemeClr val="tx1"/>
-                </a:solidFill>
-                <a:latin typeface="+mj-lt"/>
-                <a:ea typeface="+mj-ea"/>
-                <a:cs typeface="+mj-cs"/>
-              </a:defRPr>
-            </a:lvl1pPr>
-          </a:lstStyle>
-          <a:p>
-            <a:pPr marL="457200" indent="-457200" algn="l">
-              <a:buFont typeface="Wingdings" panose="05000000000000000000" pitchFamily="2" charset="2"/>
-              <a:buChar char="q"/>
-            </a:pPr>
-            <a:r>
-              <a:rPr lang="fr-FR" sz="10700" b="1" dirty="0" err="1">
-                <a:solidFill>
-                  <a:srgbClr val="0070C0"/>
-                </a:solidFill>
-                <a:latin typeface="+mn-lt"/>
-                <a:ea typeface="+mn-ea"/>
-                <a:cs typeface="+mn-cs"/>
-              </a:rPr>
-              <a:t>BasicAnalysis</a:t>
-            </a:r>
-            <a:r>
-              <a:rPr lang="fr-FR" sz="10700" b="1" dirty="0">
-                <a:solidFill>
-                  <a:srgbClr val="0070C0"/>
-                </a:solidFill>
-                <a:latin typeface="+mn-lt"/>
-                <a:ea typeface="+mn-ea"/>
-                <a:cs typeface="+mn-cs"/>
-              </a:rPr>
-              <a:t> :</a:t>
-            </a:r>
-          </a:p>
-          <a:p>
-            <a:pPr algn="l"/>
-            <a:endParaRPr lang="fr-FR" sz="8500" b="1" dirty="0">
-              <a:solidFill>
-                <a:srgbClr val="0070C0"/>
-              </a:solidFill>
-              <a:latin typeface="+mn-lt"/>
-              <a:ea typeface="+mn-ea"/>
-              <a:cs typeface="+mn-cs"/>
-            </a:endParaRPr>
-          </a:p>
-          <a:p>
-            <a:pPr marL="457200" indent="-457200" algn="l">
-              <a:buFont typeface="Wingdings" panose="05000000000000000000" pitchFamily="2" charset="2"/>
-              <a:buChar char="§"/>
-            </a:pPr>
-            <a:r>
-              <a:rPr lang="fr-FR" sz="8300" b="1" dirty="0" err="1"/>
-              <a:t>BigQuery</a:t>
-            </a:r>
-            <a:r>
-              <a:rPr lang="fr-FR" sz="8300" b="1" dirty="0"/>
-              <a:t> API </a:t>
-            </a:r>
-            <a:r>
-              <a:rPr lang="fr-FR" sz="8300" b="1" dirty="0" err="1"/>
-              <a:t>GoogleCloud</a:t>
-            </a:r>
-            <a:endParaRPr lang="fr-FR" sz="8300" b="1" dirty="0"/>
-          </a:p>
-          <a:p>
-            <a:pPr marL="457200" indent="-457200" algn="l">
-              <a:buFont typeface="Wingdings" panose="05000000000000000000" pitchFamily="2" charset="2"/>
-              <a:buChar char="§"/>
-            </a:pPr>
-            <a:r>
-              <a:rPr lang="fr-FR" sz="8300" b="1" dirty="0"/>
-              <a:t>Création d’un projet</a:t>
-            </a:r>
-          </a:p>
-          <a:p>
-            <a:pPr marL="457200" indent="-457200" algn="l">
-              <a:buFont typeface="Wingdings" panose="05000000000000000000" pitchFamily="2" charset="2"/>
-              <a:buChar char="§"/>
-            </a:pPr>
-            <a:r>
-              <a:rPr lang="fr-FR" sz="8300" b="1" dirty="0"/>
-              <a:t>Certificat PKCS12 ou fichier </a:t>
-            </a:r>
-            <a:r>
-              <a:rPr lang="fr-FR" sz="8300" b="1" dirty="0" err="1"/>
-              <a:t>Json</a:t>
-            </a:r>
-            <a:endParaRPr lang="fr-FR" sz="8300" b="1" dirty="0"/>
-          </a:p>
-          <a:p>
-            <a:pPr marL="457200" indent="-457200" algn="l">
-              <a:buFont typeface="Wingdings" panose="05000000000000000000" pitchFamily="2" charset="2"/>
-              <a:buChar char="§"/>
-            </a:pPr>
-            <a:r>
-              <a:rPr lang="fr-FR" sz="8300" b="1" dirty="0"/>
-              <a:t>Administrateur Big </a:t>
-            </a:r>
-            <a:r>
-              <a:rPr lang="fr-FR" sz="8300" b="1" dirty="0" err="1"/>
-              <a:t>Query</a:t>
-            </a:r>
-            <a:endParaRPr lang="fr-FR" sz="8300" b="1" dirty="0"/>
-          </a:p>
-          <a:p>
-            <a:pPr marL="457200" indent="-457200" algn="l">
-              <a:buFont typeface="Wingdings" panose="05000000000000000000" pitchFamily="2" charset="2"/>
-              <a:buChar char="§"/>
-            </a:pPr>
-            <a:r>
-              <a:rPr lang="fr-FR" sz="8300" b="1" dirty="0"/>
-              <a:t>Docker Spark </a:t>
-            </a:r>
-            <a:r>
-              <a:rPr lang="fr-FR" sz="8300" b="1" dirty="0" err="1"/>
-              <a:t>Jupyter</a:t>
-            </a:r>
-            <a:r>
-              <a:rPr lang="fr-FR" sz="8300" b="1" dirty="0"/>
-              <a:t> </a:t>
-            </a:r>
-            <a:r>
-              <a:rPr lang="fr-FR" sz="8300" b="1" dirty="0" err="1"/>
-              <a:t>BigQuery</a:t>
-            </a:r>
-            <a:endParaRPr lang="fr-FR" sz="8300" b="1" dirty="0"/>
-          </a:p>
-          <a:p>
-            <a:pPr marL="457200" indent="-457200" algn="l">
-              <a:buFont typeface="Wingdings" panose="05000000000000000000" pitchFamily="2" charset="2"/>
-              <a:buChar char="§"/>
-            </a:pPr>
-            <a:r>
-              <a:rPr lang="fr-FR" sz="8300" b="1" dirty="0"/>
-              <a:t>bq_helper.py (https://github.com/SohierDane/BigQuery_Helper/blob/master/bq_helper.py)</a:t>
-            </a:r>
-          </a:p>
-          <a:p>
-            <a:pPr algn="l"/>
-            <a:endParaRPr lang="fr-FR" sz="8500" b="1" dirty="0">
-              <a:solidFill>
-                <a:srgbClr val="0070C0"/>
-              </a:solidFill>
-              <a:latin typeface="+mn-lt"/>
-              <a:ea typeface="+mn-ea"/>
-              <a:cs typeface="+mn-cs"/>
-            </a:endParaRPr>
-          </a:p>
-          <a:p>
-            <a:pPr algn="l"/>
-            <a:br>
-              <a:rPr lang="fr-FR" dirty="0"/>
-            </a:br>
-            <a:endParaRPr lang="fr-FR" dirty="0"/>
-          </a:p>
-          <a:p>
-            <a:pPr algn="l"/>
-            <a:br>
-              <a:rPr lang="fr-FR" dirty="0"/>
-            </a:br>
-            <a:br>
-              <a:rPr lang="fr-FR" dirty="0"/>
-            </a:br>
-            <a:br>
-              <a:rPr lang="fr-FR" dirty="0"/>
-            </a:br>
-            <a:br>
-              <a:rPr lang="fr-FR" dirty="0"/>
-            </a:br>
-            <a:endParaRPr lang="fr-FR" dirty="0"/>
-          </a:p>
-        </p:txBody>
-      </p:sp>
-    </p:spTree>
-    <p:extLst>
-      <p:ext uri="{BB962C8B-B14F-4D97-AF65-F5344CB8AC3E}">
-        <p14:creationId xmlns:p14="http://schemas.microsoft.com/office/powerpoint/2010/main" val="2802922888"/>
-      </p:ext>
-    </p:extLst>
-  </p:cSld>
-  <p:clrMapOvr>
-    <a:masterClrMapping/>
-  </p:clrMapOvr>
-</p:sld>
-</file>
-
-<file path=ppt/slides/slide14.xml><?xml version="1.0" encoding="utf-8"?>
-<p:sld xmlns:a="http://schemas.openxmlformats.org/drawingml/2006/main" xmlns:r="http://schemas.openxmlformats.org/officeDocument/2006/relationships" xmlns:p="http://schemas.openxmlformats.org/presentationml/2006/main">
-  <p:cSld>
-    <p:spTree>
-      <p:nvGrpSpPr>
-        <p:cNvPr id="1" name=""/>
-        <p:cNvGrpSpPr/>
-        <p:nvPr/>
-      </p:nvGrpSpPr>
-      <p:grpSpPr>
-        <a:xfrm>
-          <a:off x="0" y="0"/>
-          <a:ext cx="0" cy="0"/>
-          <a:chOff x="0" y="0"/>
-          <a:chExt cx="0" cy="0"/>
-        </a:xfrm>
-      </p:grpSpPr>
-      <p:sp>
-        <p:nvSpPr>
-          <p:cNvPr id="2" name="Titre 1">
-            <a:extLst>
-              <a:ext uri="{FF2B5EF4-FFF2-40B4-BE49-F238E27FC236}">
-                <a16:creationId xmlns:a16="http://schemas.microsoft.com/office/drawing/2014/main" id="{6DCF1F16-4295-40EC-868E-5CD4431115CB}"/>
-              </a:ext>
-            </a:extLst>
-          </p:cNvPr>
-          <p:cNvSpPr>
-            <a:spLocks noGrp="1"/>
-          </p:cNvSpPr>
-          <p:nvPr>
-            <p:ph type="ctrTitle"/>
-          </p:nvPr>
-        </p:nvSpPr>
-        <p:spPr>
-          <a:xfrm>
-            <a:off x="784859" y="1186924"/>
-            <a:ext cx="10219006" cy="4812495"/>
-          </a:xfrm>
-        </p:spPr>
-        <p:txBody>
-          <a:bodyPr>
-            <a:normAutofit/>
-          </a:bodyPr>
-          <a:lstStyle/>
-          <a:p>
             <a:r>
               <a:rPr lang="fr-FR" sz="8000" dirty="0">
                 <a:solidFill>
@@ -6079,7 +5724,7 @@
 </p:sld>
 </file>
 
-<file path=ppt/slides/slide15.xml><?xml version="1.0" encoding="utf-8"?>
+<file path=ppt/slides/slide14.xml><?xml version="1.0" encoding="utf-8"?>
 <p:sld xmlns:a="http://schemas.openxmlformats.org/drawingml/2006/main" xmlns:r="http://schemas.openxmlformats.org/officeDocument/2006/relationships" xmlns:p="http://schemas.openxmlformats.org/presentationml/2006/main">
   <p:cSld>
     <p:spTree>
@@ -6451,7 +6096,7 @@
 </p:sld>
 </file>
 
-<file path=ppt/slides/slide16.xml><?xml version="1.0" encoding="utf-8"?>
+<file path=ppt/slides/slide15.xml><?xml version="1.0" encoding="utf-8"?>
 <p:sld xmlns:a="http://schemas.openxmlformats.org/drawingml/2006/main" xmlns:r="http://schemas.openxmlformats.org/officeDocument/2006/relationships" xmlns:p="http://schemas.openxmlformats.org/presentationml/2006/main">
   <p:cSld>
     <p:spTree>
@@ -6823,7 +6468,7 @@
 </p:sld>
 </file>
 
-<file path=ppt/slides/slide17.xml><?xml version="1.0" encoding="utf-8"?>
+<file path=ppt/slides/slide16.xml><?xml version="1.0" encoding="utf-8"?>
 <p:sld xmlns:a="http://schemas.openxmlformats.org/drawingml/2006/main" xmlns:r="http://schemas.openxmlformats.org/officeDocument/2006/relationships" xmlns:p="http://schemas.openxmlformats.org/presentationml/2006/main">
   <p:cSld>
     <p:spTree>
@@ -7195,7 +6840,7 @@
 </p:sld>
 </file>
 
-<file path=ppt/slides/slide18.xml><?xml version="1.0" encoding="utf-8"?>
+<file path=ppt/slides/slide17.xml><?xml version="1.0" encoding="utf-8"?>
 <p:sld xmlns:a="http://schemas.openxmlformats.org/drawingml/2006/main" xmlns:r="http://schemas.openxmlformats.org/officeDocument/2006/relationships" xmlns:p="http://schemas.openxmlformats.org/presentationml/2006/main">
   <p:cSld>
     <p:spTree>
@@ -7537,7 +7182,7 @@
 </p:sld>
 </file>
 
-<file path=ppt/slides/slide19.xml><?xml version="1.0" encoding="utf-8"?>
+<file path=ppt/slides/slide18.xml><?xml version="1.0" encoding="utf-8"?>
 <p:sld xmlns:a="http://schemas.openxmlformats.org/drawingml/2006/main" xmlns:r="http://schemas.openxmlformats.org/officeDocument/2006/relationships" xmlns:p="http://schemas.openxmlformats.org/presentationml/2006/main">
   <p:cSld>
     <p:spTree>
@@ -8555,395 +8200,7 @@
 </p:sld>
 </file>
 
-<file path=ppt/slides/slide2.xml><?xml version="1.0" encoding="utf-8"?>
-<p:sld xmlns:a="http://schemas.openxmlformats.org/drawingml/2006/main" xmlns:r="http://schemas.openxmlformats.org/officeDocument/2006/relationships" xmlns:p="http://schemas.openxmlformats.org/presentationml/2006/main">
-  <p:cSld>
-    <p:spTree>
-      <p:nvGrpSpPr>
-        <p:cNvPr id="1" name=""/>
-        <p:cNvGrpSpPr/>
-        <p:nvPr/>
-      </p:nvGrpSpPr>
-      <p:grpSpPr>
-        <a:xfrm>
-          <a:off x="0" y="0"/>
-          <a:ext cx="0" cy="0"/>
-          <a:chOff x="0" y="0"/>
-          <a:chExt cx="0" cy="0"/>
-        </a:xfrm>
-      </p:grpSpPr>
-      <p:sp>
-        <p:nvSpPr>
-          <p:cNvPr id="2" name="Titre 1">
-            <a:extLst>
-              <a:ext uri="{FF2B5EF4-FFF2-40B4-BE49-F238E27FC236}">
-                <a16:creationId xmlns:a16="http://schemas.microsoft.com/office/drawing/2014/main" id="{6DCF1F16-4295-40EC-868E-5CD4431115CB}"/>
-              </a:ext>
-            </a:extLst>
-          </p:cNvPr>
-          <p:cNvSpPr>
-            <a:spLocks noGrp="1"/>
-          </p:cNvSpPr>
-          <p:nvPr>
-            <p:ph type="ctrTitle"/>
-          </p:nvPr>
-        </p:nvSpPr>
-        <p:spPr>
-          <a:xfrm>
-            <a:off x="784859" y="1186924"/>
-            <a:ext cx="10219006" cy="4812495"/>
-          </a:xfrm>
-        </p:spPr>
-        <p:txBody>
-          <a:bodyPr>
-            <a:normAutofit/>
-          </a:bodyPr>
-          <a:lstStyle/>
-          <a:p>
-            <a:pPr algn="l"/>
-            <a:br>
-              <a:rPr lang="fr-FR" sz="2400" dirty="0"/>
-            </a:br>
-            <a:br>
-              <a:rPr lang="fr-FR" sz="2400" dirty="0"/>
-            </a:br>
-            <a:br>
-              <a:rPr lang="fr-FR" sz="2400" dirty="0"/>
-            </a:br>
-            <a:br>
-              <a:rPr lang="fr-FR" sz="2400" dirty="0"/>
-            </a:br>
-            <a:br>
-              <a:rPr lang="fr-FR" sz="2400" dirty="0"/>
-            </a:br>
-            <a:endParaRPr lang="fr-FR" sz="2400" dirty="0"/>
-          </a:p>
-        </p:txBody>
-      </p:sp>
-      <p:sp>
-        <p:nvSpPr>
-          <p:cNvPr id="3" name="Sous-titre 2">
-            <a:extLst>
-              <a:ext uri="{FF2B5EF4-FFF2-40B4-BE49-F238E27FC236}">
-                <a16:creationId xmlns:a16="http://schemas.microsoft.com/office/drawing/2014/main" id="{1B85E2F9-A5BC-4D25-A6A3-2A92E0FDED70}"/>
-              </a:ext>
-            </a:extLst>
-          </p:cNvPr>
-          <p:cNvSpPr>
-            <a:spLocks noGrp="1"/>
-          </p:cNvSpPr>
-          <p:nvPr>
-            <p:ph type="subTitle" idx="1"/>
-          </p:nvPr>
-        </p:nvSpPr>
-        <p:spPr>
-          <a:xfrm>
-            <a:off x="731520" y="136525"/>
-            <a:ext cx="10325685" cy="1050399"/>
-          </a:xfrm>
-        </p:spPr>
-        <p:txBody>
-          <a:bodyPr>
-            <a:normAutofit/>
-          </a:bodyPr>
-          <a:lstStyle/>
-          <a:p>
-            <a:r>
-              <a:rPr lang="fr-FR" b="1" dirty="0"/>
-              <a:t>Certification </a:t>
-            </a:r>
-            <a:r>
-              <a:rPr lang="fr-FR" b="1" dirty="0" err="1"/>
-              <a:t>Cegefos</a:t>
-            </a:r>
-            <a:r>
-              <a:rPr lang="fr-FR" b="1" dirty="0"/>
-              <a:t> Big Data </a:t>
-            </a:r>
-          </a:p>
-          <a:p>
-            <a:r>
-              <a:rPr lang="fr-FR" sz="3400" b="1" dirty="0">
-                <a:solidFill>
-                  <a:srgbClr val="FF0000"/>
-                </a:solidFill>
-              </a:rPr>
-              <a:t>Analyses des </a:t>
-            </a:r>
-            <a:r>
-              <a:rPr lang="fr-FR" sz="3400" b="1" dirty="0" err="1">
-                <a:solidFill>
-                  <a:srgbClr val="FF0000"/>
-                </a:solidFill>
-              </a:rPr>
-              <a:t>DataSets</a:t>
-            </a:r>
-            <a:r>
-              <a:rPr lang="fr-FR" sz="3400" b="1" dirty="0">
-                <a:solidFill>
-                  <a:srgbClr val="FF0000"/>
-                </a:solidFill>
-              </a:rPr>
-              <a:t> GitHub</a:t>
-            </a:r>
-          </a:p>
-        </p:txBody>
-      </p:sp>
-      <p:sp>
-        <p:nvSpPr>
-          <p:cNvPr id="6" name="Espace réservé de la date 5">
-            <a:extLst>
-              <a:ext uri="{FF2B5EF4-FFF2-40B4-BE49-F238E27FC236}">
-                <a16:creationId xmlns:a16="http://schemas.microsoft.com/office/drawing/2014/main" id="{1150BC5C-5713-43E9-A04B-159B1EDF0C94}"/>
-              </a:ext>
-            </a:extLst>
-          </p:cNvPr>
-          <p:cNvSpPr>
-            <a:spLocks noGrp="1"/>
-          </p:cNvSpPr>
-          <p:nvPr>
-            <p:ph type="dt" sz="half" idx="10"/>
-          </p:nvPr>
-        </p:nvSpPr>
-        <p:spPr/>
-        <p:txBody>
-          <a:bodyPr/>
-          <a:lstStyle/>
-          <a:p>
-            <a:r>
-              <a:rPr lang="fr-FR"/>
-              <a:t>19/03/2018</a:t>
-            </a:r>
-          </a:p>
-        </p:txBody>
-      </p:sp>
-      <p:sp>
-        <p:nvSpPr>
-          <p:cNvPr id="7" name="Espace réservé du pied de page 6">
-            <a:extLst>
-              <a:ext uri="{FF2B5EF4-FFF2-40B4-BE49-F238E27FC236}">
-                <a16:creationId xmlns:a16="http://schemas.microsoft.com/office/drawing/2014/main" id="{189FFD1E-7DE7-499F-8B85-382EB1F8DBD4}"/>
-              </a:ext>
-            </a:extLst>
-          </p:cNvPr>
-          <p:cNvSpPr>
-            <a:spLocks noGrp="1"/>
-          </p:cNvSpPr>
-          <p:nvPr>
-            <p:ph type="ftr" sz="quarter" idx="11"/>
-          </p:nvPr>
-        </p:nvSpPr>
-        <p:spPr/>
-        <p:txBody>
-          <a:bodyPr/>
-          <a:lstStyle/>
-          <a:p>
-            <a:r>
-              <a:rPr lang="fr-FR"/>
-              <a:t>Cegefos Certification Groupe1 : DAB / NHA / DFA / RKO</a:t>
-            </a:r>
-          </a:p>
-        </p:txBody>
-      </p:sp>
-      <p:sp>
-        <p:nvSpPr>
-          <p:cNvPr id="8" name="Titre 1">
-            <a:extLst>
-              <a:ext uri="{FF2B5EF4-FFF2-40B4-BE49-F238E27FC236}">
-                <a16:creationId xmlns:a16="http://schemas.microsoft.com/office/drawing/2014/main" id="{8406407B-8F03-4383-A51F-864F1C6820F3}"/>
-              </a:ext>
-            </a:extLst>
-          </p:cNvPr>
-          <p:cNvSpPr txBox="1">
-            <a:spLocks/>
-          </p:cNvSpPr>
-          <p:nvPr/>
-        </p:nvSpPr>
-        <p:spPr>
-          <a:xfrm>
-            <a:off x="937259" y="1339324"/>
-            <a:ext cx="10219006" cy="4812495"/>
-          </a:xfrm>
-          <a:prstGeom prst="rect">
-            <a:avLst/>
-          </a:prstGeom>
-        </p:spPr>
-        <p:txBody>
-          <a:bodyPr vert="horz" lIns="91440" tIns="45720" rIns="91440" bIns="45720" rtlCol="0" anchor="b">
-            <a:normAutofit fontScale="37500" lnSpcReduction="20000"/>
-          </a:bodyPr>
-          <a:lstStyle>
-            <a:lvl1pPr algn="ctr" defTabSz="914400" rtl="0" eaLnBrk="1" latinLnBrk="0" hangingPunct="1">
-              <a:lnSpc>
-                <a:spcPct val="90000"/>
-              </a:lnSpc>
-              <a:spcBef>
-                <a:spcPct val="0"/>
-              </a:spcBef>
-              <a:buNone/>
-              <a:defRPr sz="6000" kern="1200">
-                <a:solidFill>
-                  <a:schemeClr val="tx1"/>
-                </a:solidFill>
-                <a:latin typeface="+mj-lt"/>
-                <a:ea typeface="+mj-ea"/>
-                <a:cs typeface="+mj-cs"/>
-              </a:defRPr>
-            </a:lvl1pPr>
-          </a:lstStyle>
-          <a:p>
-            <a:pPr marL="457200" indent="-457200" algn="l">
-              <a:buFont typeface="Wingdings" panose="05000000000000000000" pitchFamily="2" charset="2"/>
-              <a:buChar char="q"/>
-            </a:pPr>
-            <a:endParaRPr lang="fr-FR" sz="8500" b="1" dirty="0">
-              <a:solidFill>
-                <a:srgbClr val="0070C0"/>
-              </a:solidFill>
-              <a:latin typeface="+mn-lt"/>
-              <a:ea typeface="+mn-ea"/>
-              <a:cs typeface="+mn-cs"/>
-            </a:endParaRPr>
-          </a:p>
-          <a:p>
-            <a:pPr marL="457200" indent="-457200" algn="l">
-              <a:buFont typeface="Wingdings" panose="05000000000000000000" pitchFamily="2" charset="2"/>
-              <a:buChar char="q"/>
-            </a:pPr>
-            <a:r>
-              <a:rPr lang="fr-FR" sz="8500" b="1" dirty="0">
-                <a:solidFill>
-                  <a:srgbClr val="0070C0"/>
-                </a:solidFill>
-                <a:latin typeface="+mn-lt"/>
-                <a:ea typeface="+mn-ea"/>
-                <a:cs typeface="+mn-cs"/>
-              </a:rPr>
-              <a:t>Organisation (1/2):</a:t>
-            </a:r>
-          </a:p>
-          <a:p>
-            <a:pPr algn="l"/>
-            <a:br>
-              <a:rPr lang="fr-FR" dirty="0"/>
-            </a:br>
-            <a:endParaRPr lang="fr-FR" dirty="0"/>
-          </a:p>
-          <a:p>
-            <a:pPr marL="457200" indent="-457200" algn="l">
-              <a:buFont typeface="Wingdings" panose="05000000000000000000" pitchFamily="2" charset="2"/>
-              <a:buChar char="§"/>
-            </a:pPr>
-            <a:r>
-              <a:rPr lang="fr-FR" b="1" dirty="0"/>
-              <a:t>DAB | NHA | DFA | RKO</a:t>
-            </a:r>
-          </a:p>
-          <a:p>
-            <a:pPr algn="l"/>
-            <a:endParaRPr lang="fr-FR" b="1" dirty="0"/>
-          </a:p>
-          <a:p>
-            <a:pPr marL="457200" indent="-457200" algn="l">
-              <a:buFont typeface="Wingdings" panose="05000000000000000000" pitchFamily="2" charset="2"/>
-              <a:buChar char="§"/>
-            </a:pPr>
-            <a:r>
-              <a:rPr lang="fr-FR" b="1" dirty="0"/>
-              <a:t>DAB =&gt; Architecture + Support + </a:t>
-            </a:r>
-            <a:r>
-              <a:rPr lang="fr-FR" b="1" dirty="0" err="1"/>
-              <a:t>Dév</a:t>
-            </a:r>
-            <a:r>
-              <a:rPr lang="fr-FR" b="1" dirty="0"/>
-              <a:t> + Requêtes +  SGBD</a:t>
-            </a:r>
-          </a:p>
-          <a:p>
-            <a:pPr marL="457200" indent="-457200" algn="l">
-              <a:buFont typeface="Wingdings" panose="05000000000000000000" pitchFamily="2" charset="2"/>
-              <a:buChar char="§"/>
-            </a:pPr>
-            <a:endParaRPr lang="fr-FR" b="1" dirty="0"/>
-          </a:p>
-          <a:p>
-            <a:pPr marL="457200" indent="-457200" algn="l">
-              <a:buFont typeface="Wingdings" panose="05000000000000000000" pitchFamily="2" charset="2"/>
-              <a:buChar char="§"/>
-            </a:pPr>
-            <a:r>
-              <a:rPr lang="fr-FR" b="1" dirty="0"/>
-              <a:t>NHA =&gt; Architecture + Simulateur + Système Consommateur-Producteur</a:t>
-            </a:r>
-          </a:p>
-          <a:p>
-            <a:pPr marL="457200" indent="-457200" algn="l">
-              <a:buFont typeface="Wingdings" panose="05000000000000000000" pitchFamily="2" charset="2"/>
-              <a:buChar char="§"/>
-            </a:pPr>
-            <a:endParaRPr lang="fr-FR" b="1" dirty="0"/>
-          </a:p>
-          <a:p>
-            <a:pPr marL="457200" indent="-457200" algn="l">
-              <a:buFont typeface="Wingdings" panose="05000000000000000000" pitchFamily="2" charset="2"/>
-              <a:buChar char="§"/>
-            </a:pPr>
-            <a:r>
-              <a:rPr lang="fr-FR" b="1" dirty="0"/>
-              <a:t>DFA =&gt; Analyses basiques + Moteur de recherche + Moteur de recommandation</a:t>
-            </a:r>
-          </a:p>
-          <a:p>
-            <a:pPr marL="457200" indent="-457200" algn="l">
-              <a:buFont typeface="Wingdings" panose="05000000000000000000" pitchFamily="2" charset="2"/>
-              <a:buChar char="§"/>
-            </a:pPr>
-            <a:endParaRPr lang="fr-FR" b="1" dirty="0"/>
-          </a:p>
-          <a:p>
-            <a:pPr marL="457200" indent="-457200" algn="l">
-              <a:buFont typeface="Wingdings" panose="05000000000000000000" pitchFamily="2" charset="2"/>
-              <a:buChar char="§"/>
-            </a:pPr>
-            <a:r>
-              <a:rPr lang="fr-FR" b="1" dirty="0"/>
-              <a:t>RKO =&gt; Machine Learning</a:t>
-            </a:r>
-          </a:p>
-          <a:p>
-            <a:pPr algn="l"/>
-            <a:br>
-              <a:rPr lang="fr-FR" dirty="0"/>
-            </a:br>
-            <a:br>
-              <a:rPr lang="fr-FR" dirty="0"/>
-            </a:br>
-            <a:br>
-              <a:rPr lang="fr-FR" dirty="0"/>
-            </a:br>
-            <a:br>
-              <a:rPr lang="fr-FR" dirty="0"/>
-            </a:br>
-            <a:endParaRPr lang="fr-FR" dirty="0"/>
-          </a:p>
-        </p:txBody>
-      </p:sp>
-    </p:spTree>
-    <p:extLst>
-      <p:ext uri="{BB962C8B-B14F-4D97-AF65-F5344CB8AC3E}">
-        <p14:creationId xmlns:p14="http://schemas.microsoft.com/office/powerpoint/2010/main" val="146594172"/>
-      </p:ext>
-    </p:extLst>
-  </p:cSld>
-  <p:clrMapOvr>
-    <a:masterClrMapping/>
-  </p:clrMapOvr>
-</p:sld>
-</file>
-
-<file path=ppt/slides/slide20.xml><?xml version="1.0" encoding="utf-8"?>
+<file path=ppt/slides/slide19.xml><?xml version="1.0" encoding="utf-8"?>
 <p:sld xmlns:a="http://schemas.openxmlformats.org/drawingml/2006/main" xmlns:r="http://schemas.openxmlformats.org/officeDocument/2006/relationships" xmlns:p="http://schemas.openxmlformats.org/presentationml/2006/main">
   <p:cSld>
     <p:spTree>
@@ -9731,7 +8988,395 @@
 </p:sld>
 </file>
 
-<file path=ppt/slides/slide21.xml><?xml version="1.0" encoding="utf-8"?>
+<file path=ppt/slides/slide2.xml><?xml version="1.0" encoding="utf-8"?>
+<p:sld xmlns:a="http://schemas.openxmlformats.org/drawingml/2006/main" xmlns:r="http://schemas.openxmlformats.org/officeDocument/2006/relationships" xmlns:p="http://schemas.openxmlformats.org/presentationml/2006/main">
+  <p:cSld>
+    <p:spTree>
+      <p:nvGrpSpPr>
+        <p:cNvPr id="1" name=""/>
+        <p:cNvGrpSpPr/>
+        <p:nvPr/>
+      </p:nvGrpSpPr>
+      <p:grpSpPr>
+        <a:xfrm>
+          <a:off x="0" y="0"/>
+          <a:ext cx="0" cy="0"/>
+          <a:chOff x="0" y="0"/>
+          <a:chExt cx="0" cy="0"/>
+        </a:xfrm>
+      </p:grpSpPr>
+      <p:sp>
+        <p:nvSpPr>
+          <p:cNvPr id="2" name="Titre 1">
+            <a:extLst>
+              <a:ext uri="{FF2B5EF4-FFF2-40B4-BE49-F238E27FC236}">
+                <a16:creationId xmlns:a16="http://schemas.microsoft.com/office/drawing/2014/main" id="{6DCF1F16-4295-40EC-868E-5CD4431115CB}"/>
+              </a:ext>
+            </a:extLst>
+          </p:cNvPr>
+          <p:cNvSpPr>
+            <a:spLocks noGrp="1"/>
+          </p:cNvSpPr>
+          <p:nvPr>
+            <p:ph type="ctrTitle"/>
+          </p:nvPr>
+        </p:nvSpPr>
+        <p:spPr>
+          <a:xfrm>
+            <a:off x="784859" y="1186924"/>
+            <a:ext cx="10219006" cy="4812495"/>
+          </a:xfrm>
+        </p:spPr>
+        <p:txBody>
+          <a:bodyPr>
+            <a:normAutofit/>
+          </a:bodyPr>
+          <a:lstStyle/>
+          <a:p>
+            <a:pPr algn="l"/>
+            <a:br>
+              <a:rPr lang="fr-FR" sz="2400" dirty="0"/>
+            </a:br>
+            <a:br>
+              <a:rPr lang="fr-FR" sz="2400" dirty="0"/>
+            </a:br>
+            <a:br>
+              <a:rPr lang="fr-FR" sz="2400" dirty="0"/>
+            </a:br>
+            <a:br>
+              <a:rPr lang="fr-FR" sz="2400" dirty="0"/>
+            </a:br>
+            <a:br>
+              <a:rPr lang="fr-FR" sz="2400" dirty="0"/>
+            </a:br>
+            <a:endParaRPr lang="fr-FR" sz="2400" dirty="0"/>
+          </a:p>
+        </p:txBody>
+      </p:sp>
+      <p:sp>
+        <p:nvSpPr>
+          <p:cNvPr id="3" name="Sous-titre 2">
+            <a:extLst>
+              <a:ext uri="{FF2B5EF4-FFF2-40B4-BE49-F238E27FC236}">
+                <a16:creationId xmlns:a16="http://schemas.microsoft.com/office/drawing/2014/main" id="{1B85E2F9-A5BC-4D25-A6A3-2A92E0FDED70}"/>
+              </a:ext>
+            </a:extLst>
+          </p:cNvPr>
+          <p:cNvSpPr>
+            <a:spLocks noGrp="1"/>
+          </p:cNvSpPr>
+          <p:nvPr>
+            <p:ph type="subTitle" idx="1"/>
+          </p:nvPr>
+        </p:nvSpPr>
+        <p:spPr>
+          <a:xfrm>
+            <a:off x="731520" y="136525"/>
+            <a:ext cx="10325685" cy="1050399"/>
+          </a:xfrm>
+        </p:spPr>
+        <p:txBody>
+          <a:bodyPr>
+            <a:normAutofit/>
+          </a:bodyPr>
+          <a:lstStyle/>
+          <a:p>
+            <a:r>
+              <a:rPr lang="fr-FR" b="1" dirty="0"/>
+              <a:t>Certification </a:t>
+            </a:r>
+            <a:r>
+              <a:rPr lang="fr-FR" b="1" dirty="0" err="1"/>
+              <a:t>Cegefos</a:t>
+            </a:r>
+            <a:r>
+              <a:rPr lang="fr-FR" b="1" dirty="0"/>
+              <a:t> Big Data </a:t>
+            </a:r>
+          </a:p>
+          <a:p>
+            <a:r>
+              <a:rPr lang="fr-FR" sz="3400" b="1" dirty="0">
+                <a:solidFill>
+                  <a:srgbClr val="FF0000"/>
+                </a:solidFill>
+              </a:rPr>
+              <a:t>Analyses des </a:t>
+            </a:r>
+            <a:r>
+              <a:rPr lang="fr-FR" sz="3400" b="1" dirty="0" err="1">
+                <a:solidFill>
+                  <a:srgbClr val="FF0000"/>
+                </a:solidFill>
+              </a:rPr>
+              <a:t>DataSets</a:t>
+            </a:r>
+            <a:r>
+              <a:rPr lang="fr-FR" sz="3400" b="1" dirty="0">
+                <a:solidFill>
+                  <a:srgbClr val="FF0000"/>
+                </a:solidFill>
+              </a:rPr>
+              <a:t> GitHub</a:t>
+            </a:r>
+          </a:p>
+        </p:txBody>
+      </p:sp>
+      <p:sp>
+        <p:nvSpPr>
+          <p:cNvPr id="6" name="Espace réservé de la date 5">
+            <a:extLst>
+              <a:ext uri="{FF2B5EF4-FFF2-40B4-BE49-F238E27FC236}">
+                <a16:creationId xmlns:a16="http://schemas.microsoft.com/office/drawing/2014/main" id="{1150BC5C-5713-43E9-A04B-159B1EDF0C94}"/>
+              </a:ext>
+            </a:extLst>
+          </p:cNvPr>
+          <p:cNvSpPr>
+            <a:spLocks noGrp="1"/>
+          </p:cNvSpPr>
+          <p:nvPr>
+            <p:ph type="dt" sz="half" idx="10"/>
+          </p:nvPr>
+        </p:nvSpPr>
+        <p:spPr/>
+        <p:txBody>
+          <a:bodyPr/>
+          <a:lstStyle/>
+          <a:p>
+            <a:r>
+              <a:rPr lang="fr-FR"/>
+              <a:t>19/03/2018</a:t>
+            </a:r>
+          </a:p>
+        </p:txBody>
+      </p:sp>
+      <p:sp>
+        <p:nvSpPr>
+          <p:cNvPr id="7" name="Espace réservé du pied de page 6">
+            <a:extLst>
+              <a:ext uri="{FF2B5EF4-FFF2-40B4-BE49-F238E27FC236}">
+                <a16:creationId xmlns:a16="http://schemas.microsoft.com/office/drawing/2014/main" id="{189FFD1E-7DE7-499F-8B85-382EB1F8DBD4}"/>
+              </a:ext>
+            </a:extLst>
+          </p:cNvPr>
+          <p:cNvSpPr>
+            <a:spLocks noGrp="1"/>
+          </p:cNvSpPr>
+          <p:nvPr>
+            <p:ph type="ftr" sz="quarter" idx="11"/>
+          </p:nvPr>
+        </p:nvSpPr>
+        <p:spPr/>
+        <p:txBody>
+          <a:bodyPr/>
+          <a:lstStyle/>
+          <a:p>
+            <a:r>
+              <a:rPr lang="fr-FR"/>
+              <a:t>Cegefos Certification Groupe1 : DAB / NHA / DFA / RKO</a:t>
+            </a:r>
+          </a:p>
+        </p:txBody>
+      </p:sp>
+      <p:sp>
+        <p:nvSpPr>
+          <p:cNvPr id="8" name="Titre 1">
+            <a:extLst>
+              <a:ext uri="{FF2B5EF4-FFF2-40B4-BE49-F238E27FC236}">
+                <a16:creationId xmlns:a16="http://schemas.microsoft.com/office/drawing/2014/main" id="{8406407B-8F03-4383-A51F-864F1C6820F3}"/>
+              </a:ext>
+            </a:extLst>
+          </p:cNvPr>
+          <p:cNvSpPr txBox="1">
+            <a:spLocks/>
+          </p:cNvSpPr>
+          <p:nvPr/>
+        </p:nvSpPr>
+        <p:spPr>
+          <a:xfrm>
+            <a:off x="937259" y="1339324"/>
+            <a:ext cx="10219006" cy="4812495"/>
+          </a:xfrm>
+          <a:prstGeom prst="rect">
+            <a:avLst/>
+          </a:prstGeom>
+        </p:spPr>
+        <p:txBody>
+          <a:bodyPr vert="horz" lIns="91440" tIns="45720" rIns="91440" bIns="45720" rtlCol="0" anchor="b">
+            <a:normAutofit fontScale="37500" lnSpcReduction="20000"/>
+          </a:bodyPr>
+          <a:lstStyle>
+            <a:lvl1pPr algn="ctr" defTabSz="914400" rtl="0" eaLnBrk="1" latinLnBrk="0" hangingPunct="1">
+              <a:lnSpc>
+                <a:spcPct val="90000"/>
+              </a:lnSpc>
+              <a:spcBef>
+                <a:spcPct val="0"/>
+              </a:spcBef>
+              <a:buNone/>
+              <a:defRPr sz="6000" kern="1200">
+                <a:solidFill>
+                  <a:schemeClr val="tx1"/>
+                </a:solidFill>
+                <a:latin typeface="+mj-lt"/>
+                <a:ea typeface="+mj-ea"/>
+                <a:cs typeface="+mj-cs"/>
+              </a:defRPr>
+            </a:lvl1pPr>
+          </a:lstStyle>
+          <a:p>
+            <a:pPr marL="457200" indent="-457200" algn="l">
+              <a:buFont typeface="Wingdings" panose="05000000000000000000" pitchFamily="2" charset="2"/>
+              <a:buChar char="q"/>
+            </a:pPr>
+            <a:endParaRPr lang="fr-FR" sz="8500" b="1" dirty="0">
+              <a:solidFill>
+                <a:srgbClr val="0070C0"/>
+              </a:solidFill>
+              <a:latin typeface="+mn-lt"/>
+              <a:ea typeface="+mn-ea"/>
+              <a:cs typeface="+mn-cs"/>
+            </a:endParaRPr>
+          </a:p>
+          <a:p>
+            <a:pPr marL="457200" indent="-457200" algn="l">
+              <a:buFont typeface="Wingdings" panose="05000000000000000000" pitchFamily="2" charset="2"/>
+              <a:buChar char="q"/>
+            </a:pPr>
+            <a:r>
+              <a:rPr lang="fr-FR" sz="8500" b="1" dirty="0">
+                <a:solidFill>
+                  <a:srgbClr val="0070C0"/>
+                </a:solidFill>
+                <a:latin typeface="+mn-lt"/>
+                <a:ea typeface="+mn-ea"/>
+                <a:cs typeface="+mn-cs"/>
+              </a:rPr>
+              <a:t>Organisation (1/2):</a:t>
+            </a:r>
+          </a:p>
+          <a:p>
+            <a:pPr algn="l"/>
+            <a:br>
+              <a:rPr lang="fr-FR" dirty="0"/>
+            </a:br>
+            <a:endParaRPr lang="fr-FR" dirty="0"/>
+          </a:p>
+          <a:p>
+            <a:pPr marL="457200" indent="-457200" algn="l">
+              <a:buFont typeface="Wingdings" panose="05000000000000000000" pitchFamily="2" charset="2"/>
+              <a:buChar char="§"/>
+            </a:pPr>
+            <a:r>
+              <a:rPr lang="fr-FR" b="1" dirty="0"/>
+              <a:t>DAB | NHA | DFA | RKO</a:t>
+            </a:r>
+          </a:p>
+          <a:p>
+            <a:pPr algn="l"/>
+            <a:endParaRPr lang="fr-FR" b="1" dirty="0"/>
+          </a:p>
+          <a:p>
+            <a:pPr marL="457200" indent="-457200" algn="l">
+              <a:buFont typeface="Wingdings" panose="05000000000000000000" pitchFamily="2" charset="2"/>
+              <a:buChar char="§"/>
+            </a:pPr>
+            <a:r>
+              <a:rPr lang="fr-FR" b="1" dirty="0"/>
+              <a:t>DAB =&gt; Architecture + Support + </a:t>
+            </a:r>
+            <a:r>
+              <a:rPr lang="fr-FR" b="1" dirty="0" err="1"/>
+              <a:t>Dév</a:t>
+            </a:r>
+            <a:r>
+              <a:rPr lang="fr-FR" b="1" dirty="0"/>
+              <a:t> + Requêtes +  SGBD</a:t>
+            </a:r>
+          </a:p>
+          <a:p>
+            <a:pPr marL="457200" indent="-457200" algn="l">
+              <a:buFont typeface="Wingdings" panose="05000000000000000000" pitchFamily="2" charset="2"/>
+              <a:buChar char="§"/>
+            </a:pPr>
+            <a:endParaRPr lang="fr-FR" b="1" dirty="0"/>
+          </a:p>
+          <a:p>
+            <a:pPr marL="457200" indent="-457200" algn="l">
+              <a:buFont typeface="Wingdings" panose="05000000000000000000" pitchFamily="2" charset="2"/>
+              <a:buChar char="§"/>
+            </a:pPr>
+            <a:r>
+              <a:rPr lang="fr-FR" b="1" dirty="0"/>
+              <a:t>NHA =&gt; Architecture + Simulateur + Système Consommateur-Producteur</a:t>
+            </a:r>
+          </a:p>
+          <a:p>
+            <a:pPr marL="457200" indent="-457200" algn="l">
+              <a:buFont typeface="Wingdings" panose="05000000000000000000" pitchFamily="2" charset="2"/>
+              <a:buChar char="§"/>
+            </a:pPr>
+            <a:endParaRPr lang="fr-FR" b="1" dirty="0"/>
+          </a:p>
+          <a:p>
+            <a:pPr marL="457200" indent="-457200" algn="l">
+              <a:buFont typeface="Wingdings" panose="05000000000000000000" pitchFamily="2" charset="2"/>
+              <a:buChar char="§"/>
+            </a:pPr>
+            <a:r>
+              <a:rPr lang="fr-FR" b="1" dirty="0"/>
+              <a:t>DFA =&gt; Analyses basiques + Moteur de recherche + Moteur de recommandation</a:t>
+            </a:r>
+          </a:p>
+          <a:p>
+            <a:pPr marL="457200" indent="-457200" algn="l">
+              <a:buFont typeface="Wingdings" panose="05000000000000000000" pitchFamily="2" charset="2"/>
+              <a:buChar char="§"/>
+            </a:pPr>
+            <a:endParaRPr lang="fr-FR" b="1" dirty="0"/>
+          </a:p>
+          <a:p>
+            <a:pPr marL="457200" indent="-457200" algn="l">
+              <a:buFont typeface="Wingdings" panose="05000000000000000000" pitchFamily="2" charset="2"/>
+              <a:buChar char="§"/>
+            </a:pPr>
+            <a:r>
+              <a:rPr lang="fr-FR" b="1" dirty="0"/>
+              <a:t>RKO =&gt; Machine Learning</a:t>
+            </a:r>
+          </a:p>
+          <a:p>
+            <a:pPr algn="l"/>
+            <a:br>
+              <a:rPr lang="fr-FR" dirty="0"/>
+            </a:br>
+            <a:br>
+              <a:rPr lang="fr-FR" dirty="0"/>
+            </a:br>
+            <a:br>
+              <a:rPr lang="fr-FR" dirty="0"/>
+            </a:br>
+            <a:br>
+              <a:rPr lang="fr-FR" dirty="0"/>
+            </a:br>
+            <a:endParaRPr lang="fr-FR" dirty="0"/>
+          </a:p>
+        </p:txBody>
+      </p:sp>
+    </p:spTree>
+    <p:extLst>
+      <p:ext uri="{BB962C8B-B14F-4D97-AF65-F5344CB8AC3E}">
+        <p14:creationId xmlns:p14="http://schemas.microsoft.com/office/powerpoint/2010/main" val="146594172"/>
+      </p:ext>
+    </p:extLst>
+  </p:cSld>
+  <p:clrMapOvr>
+    <a:masterClrMapping/>
+  </p:clrMapOvr>
+</p:sld>
+</file>
+
+<file path=ppt/slides/slide20.xml><?xml version="1.0" encoding="utf-8"?>
 <p:sld xmlns:a="http://schemas.openxmlformats.org/drawingml/2006/main" xmlns:r="http://schemas.openxmlformats.org/officeDocument/2006/relationships" xmlns:p="http://schemas.openxmlformats.org/presentationml/2006/main">
   <p:cSld>
     <p:spTree>
@@ -13729,7 +13374,7 @@
 </p:sld>
 </file>
 
-<file path=ppt/slides/slide22.xml><?xml version="1.0" encoding="utf-8"?>
+<file path=ppt/slides/slide21.xml><?xml version="1.0" encoding="utf-8"?>
 <p:sld xmlns:a="http://schemas.openxmlformats.org/drawingml/2006/main" xmlns:r="http://schemas.openxmlformats.org/officeDocument/2006/relationships" xmlns:p="http://schemas.openxmlformats.org/presentationml/2006/main">
   <p:cSld>
     <p:spTree>
@@ -14904,7 +14549,7 @@
 </p:sld>
 </file>
 
-<file path=ppt/slides/slide23.xml><?xml version="1.0" encoding="utf-8"?>
+<file path=ppt/slides/slide22.xml><?xml version="1.0" encoding="utf-8"?>
 <p:sld xmlns:a="http://schemas.openxmlformats.org/drawingml/2006/main" xmlns:r="http://schemas.openxmlformats.org/officeDocument/2006/relationships" xmlns:p="http://schemas.openxmlformats.org/presentationml/2006/main">
   <p:cSld>
     <p:spTree>
@@ -15973,7 +15618,7 @@
 </p:sld>
 </file>
 
-<file path=ppt/slides/slide24.xml><?xml version="1.0" encoding="utf-8"?>
+<file path=ppt/slides/slide23.xml><?xml version="1.0" encoding="utf-8"?>
 <p:sld xmlns:a="http://schemas.openxmlformats.org/drawingml/2006/main" xmlns:r="http://schemas.openxmlformats.org/officeDocument/2006/relationships" xmlns:p="http://schemas.openxmlformats.org/presentationml/2006/main">
   <p:cSld>
     <p:spTree>
@@ -18812,7 +18457,7 @@
 </p:sld>
 </file>
 
-<file path=ppt/slides/slide25.xml><?xml version="1.0" encoding="utf-8"?>
+<file path=ppt/slides/slide24.xml><?xml version="1.0" encoding="utf-8"?>
 <p:sld xmlns:a="http://schemas.openxmlformats.org/drawingml/2006/main" xmlns:r="http://schemas.openxmlformats.org/officeDocument/2006/relationships" xmlns:p="http://schemas.openxmlformats.org/presentationml/2006/main">
   <p:cSld>
     <p:spTree>
@@ -19176,7 +18821,7 @@
 </p:sld>
 </file>
 
-<file path=ppt/slides/slide26.xml><?xml version="1.0" encoding="utf-8"?>
+<file path=ppt/slides/slide25.xml><?xml version="1.0" encoding="utf-8"?>
 <p:sld xmlns:a="http://schemas.openxmlformats.org/drawingml/2006/main" xmlns:r="http://schemas.openxmlformats.org/officeDocument/2006/relationships" xmlns:p="http://schemas.openxmlformats.org/presentationml/2006/main">
   <p:cSld>
     <p:spTree>
@@ -19537,7 +19182,7 @@
 </p:sld>
 </file>
 
-<file path=ppt/slides/slide27.xml><?xml version="1.0" encoding="utf-8"?>
+<file path=ppt/slides/slide26.xml><?xml version="1.0" encoding="utf-8"?>
 <p:sld xmlns:a="http://schemas.openxmlformats.org/drawingml/2006/main" xmlns:r="http://schemas.openxmlformats.org/officeDocument/2006/relationships" xmlns:p="http://schemas.openxmlformats.org/presentationml/2006/main">
   <p:cSld>
     <p:spTree>

</xml_diff>